<commit_message>
Präsentation und Neue Stimmen
</commit_message>
<xml_diff>
--- a/VoiceRecognition_Zwischenstand .pptx
+++ b/VoiceRecognition_Zwischenstand .pptx
@@ -10,12 +10,13 @@
     <p:sldId id="274" r:id="rId4"/>
     <p:sldId id="269" r:id="rId5"/>
     <p:sldId id="270" r:id="rId6"/>
-    <p:sldId id="265" r:id="rId7"/>
-    <p:sldId id="272" r:id="rId8"/>
-    <p:sldId id="273" r:id="rId9"/>
-    <p:sldId id="271" r:id="rId10"/>
-    <p:sldId id="266" r:id="rId11"/>
-    <p:sldId id="261" r:id="rId12"/>
+    <p:sldId id="275" r:id="rId7"/>
+    <p:sldId id="273" r:id="rId8"/>
+    <p:sldId id="265" r:id="rId9"/>
+    <p:sldId id="272" r:id="rId10"/>
+    <p:sldId id="271" r:id="rId11"/>
+    <p:sldId id="266" r:id="rId12"/>
+    <p:sldId id="261" r:id="rId13"/>
   </p:sldIdLst>
   <p:sldSz cx="12192000" cy="6858000"/>
   <p:notesSz cx="6858000" cy="9144000"/>
@@ -125,7 +126,8 @@
 <file path=ppt/revisionInfo.xml><?xml version="1.0" encoding="utf-8"?>
 <p1510:revInfo xmlns:a="http://schemas.openxmlformats.org/drawingml/2006/main" xmlns:r="http://schemas.openxmlformats.org/officeDocument/2006/relationships" xmlns:p1510="http://schemas.microsoft.com/office/powerpoint/2015/10/main">
   <p1510:revLst>
-    <p1510:client id="{B32499CD-2104-A00C-A7EF-8BA661A19216}" v="40" dt="2024-12-04T13:49:27.696"/>
+    <p1510:client id="{054964AE-63EC-7AC7-BF81-8E1ABEB072B1}" v="30" dt="2024-12-11T00:37:11.344"/>
+    <p1510:client id="{82ABECE8-6458-01B6-E21D-FDC15A6BDCA6}" v="91" dt="2024-12-11T00:53:44.294"/>
   </p1510:revLst>
 </p1510:revInfo>
 </file>
@@ -4836,6 +4838,666 @@
 <file path=ppt/slides/slide10.xml><?xml version="1.0" encoding="utf-8"?>
 <p:sld xmlns:a="http://schemas.openxmlformats.org/drawingml/2006/main" xmlns:r="http://schemas.openxmlformats.org/officeDocument/2006/relationships" xmlns:p="http://schemas.openxmlformats.org/presentationml/2006/main">
   <p:cSld>
+    <p:bg>
+      <p:bgPr>
+        <a:solidFill>
+          <a:schemeClr val="bg2"/>
+        </a:solidFill>
+        <a:effectLst/>
+      </p:bgPr>
+    </p:bg>
+    <p:spTree>
+      <p:nvGrpSpPr>
+        <p:cNvPr id="1" name="">
+          <a:extLst>
+            <a:ext uri="{FF2B5EF4-FFF2-40B4-BE49-F238E27FC236}">
+              <a16:creationId xmlns:a16="http://schemas.microsoft.com/office/drawing/2014/main" id="{E6DA0CC2-0F59-2C11-06FA-CF839DEC99A6}"/>
+            </a:ext>
+          </a:extLst>
+        </p:cNvPr>
+        <p:cNvGrpSpPr/>
+        <p:nvPr/>
+      </p:nvGrpSpPr>
+      <p:grpSpPr>
+        <a:xfrm>
+          <a:off x="0" y="0"/>
+          <a:ext cx="0" cy="0"/>
+          <a:chOff x="0" y="0"/>
+          <a:chExt cx="0" cy="0"/>
+        </a:xfrm>
+      </p:grpSpPr>
+      <p:sp useBgFill="1">
+        <p:nvSpPr>
+          <p:cNvPr id="41" name="Background Fill">
+            <a:extLst>
+              <a:ext uri="{FF2B5EF4-FFF2-40B4-BE49-F238E27FC236}">
+                <a16:creationId xmlns:a16="http://schemas.microsoft.com/office/drawing/2014/main" id="{B937640E-EF7A-4A6C-A950-D12B7D5C923E}"/>
+              </a:ext>
+              <a:ext uri="{C183D7F6-B498-43B3-948B-1728B52AA6E4}">
+                <adec:decorative xmlns:adec="http://schemas.microsoft.com/office/drawing/2017/decorative" val="1"/>
+              </a:ext>
+            </a:extLst>
+          </p:cNvPr>
+          <p:cNvSpPr>
+            <a:spLocks noGrp="1" noRot="1" noChangeAspect="1" noMove="1" noResize="1" noEditPoints="1" noAdjustHandles="1" noChangeArrowheads="1" noChangeShapeType="1" noTextEdit="1"/>
+          </p:cNvSpPr>
+          <p:nvPr>
+            <p:extLst>
+              <p:ext uri="{386F3935-93C4-4BCD-93E2-E3B085C9AB24}">
+                <p16:designElem xmlns:p16="http://schemas.microsoft.com/office/powerpoint/2015/main" val="1"/>
+              </p:ext>
+            </p:extLst>
+          </p:nvPr>
+        </p:nvSpPr>
+        <p:spPr>
+          <a:xfrm>
+            <a:off x="0" y="0"/>
+            <a:ext cx="12188952" cy="6858000"/>
+          </a:xfrm>
+          <a:prstGeom prst="rect">
+            <a:avLst/>
+          </a:prstGeom>
+          <a:ln>
+            <a:noFill/>
+          </a:ln>
+        </p:spPr>
+        <p:style>
+          <a:lnRef idx="2">
+            <a:schemeClr val="accent1">
+              <a:shade val="50000"/>
+            </a:schemeClr>
+          </a:lnRef>
+          <a:fillRef idx="1">
+            <a:schemeClr val="accent1"/>
+          </a:fillRef>
+          <a:effectRef idx="0">
+            <a:schemeClr val="accent1"/>
+          </a:effectRef>
+          <a:fontRef idx="minor">
+            <a:schemeClr val="lt1"/>
+          </a:fontRef>
+        </p:style>
+        <p:txBody>
+          <a:bodyPr rtlCol="0" anchor="ctr"/>
+          <a:lstStyle/>
+          <a:p>
+            <a:pPr algn="ctr"/>
+            <a:endParaRPr lang="en-US"/>
+          </a:p>
+        </p:txBody>
+      </p:sp>
+      <p:sp>
+        <p:nvSpPr>
+          <p:cNvPr id="42" name="Rectangle 28">
+            <a:extLst>
+              <a:ext uri="{FF2B5EF4-FFF2-40B4-BE49-F238E27FC236}">
+                <a16:creationId xmlns:a16="http://schemas.microsoft.com/office/drawing/2014/main" id="{961DDC38-D3E1-447D-8E7A-F1FB7A61351B}"/>
+              </a:ext>
+              <a:ext uri="{C183D7F6-B498-43B3-948B-1728B52AA6E4}">
+                <adec:decorative xmlns:adec="http://schemas.microsoft.com/office/drawing/2017/decorative" val="1"/>
+              </a:ext>
+            </a:extLst>
+          </p:cNvPr>
+          <p:cNvSpPr>
+            <a:spLocks noGrp="1" noRot="1" noChangeAspect="1" noMove="1" noResize="1" noEditPoints="1" noAdjustHandles="1" noChangeArrowheads="1" noChangeShapeType="1" noTextEdit="1"/>
+          </p:cNvSpPr>
+          <p:nvPr>
+            <p:extLst>
+              <p:ext uri="{386F3935-93C4-4BCD-93E2-E3B085C9AB24}">
+                <p16:designElem xmlns:p16="http://schemas.microsoft.com/office/powerpoint/2015/main" val="1"/>
+              </p:ext>
+            </p:extLst>
+          </p:nvPr>
+        </p:nvSpPr>
+        <p:spPr>
+          <a:xfrm>
+            <a:off x="0" y="0"/>
+            <a:ext cx="12192001" cy="6858000"/>
+          </a:xfrm>
+          <a:prstGeom prst="rect">
+            <a:avLst/>
+          </a:prstGeom>
+          <a:solidFill>
+            <a:srgbClr val="AEAEAE">
+              <a:alpha val="10000"/>
+            </a:srgbClr>
+          </a:solidFill>
+          <a:ln>
+            <a:noFill/>
+          </a:ln>
+        </p:spPr>
+        <p:style>
+          <a:lnRef idx="2">
+            <a:schemeClr val="accent1">
+              <a:shade val="50000"/>
+            </a:schemeClr>
+          </a:lnRef>
+          <a:fillRef idx="1">
+            <a:schemeClr val="accent1"/>
+          </a:fillRef>
+          <a:effectRef idx="0">
+            <a:schemeClr val="accent1"/>
+          </a:effectRef>
+          <a:fontRef idx="minor">
+            <a:schemeClr val="lt1"/>
+          </a:fontRef>
+        </p:style>
+        <p:txBody>
+          <a:bodyPr rtlCol="0" anchor="ctr"/>
+          <a:lstStyle/>
+          <a:p>
+            <a:pPr algn="ctr"/>
+            <a:endParaRPr lang="en-US" dirty="0"/>
+          </a:p>
+        </p:txBody>
+      </p:sp>
+      <p:sp>
+        <p:nvSpPr>
+          <p:cNvPr id="43" name="Freeform: Shape 30">
+            <a:extLst>
+              <a:ext uri="{FF2B5EF4-FFF2-40B4-BE49-F238E27FC236}">
+                <a16:creationId xmlns:a16="http://schemas.microsoft.com/office/drawing/2014/main" id="{FC7A5CC7-A1F9-46CC-BAC8-46E258CD3E10}"/>
+              </a:ext>
+              <a:ext uri="{C183D7F6-B498-43B3-948B-1728B52AA6E4}">
+                <adec:decorative xmlns:adec="http://schemas.microsoft.com/office/drawing/2017/decorative" val="1"/>
+              </a:ext>
+            </a:extLst>
+          </p:cNvPr>
+          <p:cNvSpPr>
+            <a:spLocks noGrp="1" noRot="1" noChangeAspect="1" noMove="1" noResize="1" noEditPoints="1" noAdjustHandles="1" noChangeArrowheads="1" noChangeShapeType="1" noTextEdit="1"/>
+          </p:cNvSpPr>
+          <p:nvPr>
+            <p:extLst>
+              <p:ext uri="{386F3935-93C4-4BCD-93E2-E3B085C9AB24}">
+                <p16:designElem xmlns:p16="http://schemas.microsoft.com/office/powerpoint/2015/main" val="1"/>
+              </p:ext>
+            </p:extLst>
+          </p:nvPr>
+        </p:nvSpPr>
+        <p:spPr>
+          <a:xfrm>
+            <a:off x="9356630" y="4160168"/>
+            <a:ext cx="2832322" cy="2697833"/>
+          </a:xfrm>
+          <a:custGeom>
+            <a:avLst/>
+            <a:gdLst>
+              <a:gd name="connsiteX0" fmla="*/ 638993 w 2832322"/>
+              <a:gd name="connsiteY0" fmla="*/ 1429605 h 2697833"/>
+              <a:gd name="connsiteX1" fmla="*/ 798503 w 2832322"/>
+              <a:gd name="connsiteY1" fmla="*/ 1509001 h 2697833"/>
+              <a:gd name="connsiteX2" fmla="*/ 739507 w 2832322"/>
+              <a:gd name="connsiteY2" fmla="*/ 1729178 h 2697833"/>
+              <a:gd name="connsiteX3" fmla="*/ 519329 w 2832322"/>
+              <a:gd name="connsiteY3" fmla="*/ 1670181 h 2697833"/>
+              <a:gd name="connsiteX4" fmla="*/ 578327 w 2832322"/>
+              <a:gd name="connsiteY4" fmla="*/ 1450005 h 2697833"/>
+              <a:gd name="connsiteX5" fmla="*/ 638993 w 2832322"/>
+              <a:gd name="connsiteY5" fmla="*/ 1429605 h 2697833"/>
+              <a:gd name="connsiteX6" fmla="*/ 1252193 w 2832322"/>
+              <a:gd name="connsiteY6" fmla="*/ 835524 h 2697833"/>
+              <a:gd name="connsiteX7" fmla="*/ 1511699 w 2832322"/>
+              <a:gd name="connsiteY7" fmla="*/ 997686 h 2697833"/>
+              <a:gd name="connsiteX8" fmla="*/ 1392436 w 2832322"/>
+              <a:gd name="connsiteY8" fmla="*/ 1442788 h 2697833"/>
+              <a:gd name="connsiteX9" fmla="*/ 947333 w 2832322"/>
+              <a:gd name="connsiteY9" fmla="*/ 1323523 h 2697833"/>
+              <a:gd name="connsiteX10" fmla="*/ 1066598 w 2832322"/>
+              <a:gd name="connsiteY10" fmla="*/ 878421 h 2697833"/>
+              <a:gd name="connsiteX11" fmla="*/ 1252193 w 2832322"/>
+              <a:gd name="connsiteY11" fmla="*/ 835524 h 2697833"/>
+              <a:gd name="connsiteX12" fmla="*/ 2832322 w 2832322"/>
+              <a:gd name="connsiteY12" fmla="*/ 0 h 2697833"/>
+              <a:gd name="connsiteX13" fmla="*/ 2832322 w 2832322"/>
+              <a:gd name="connsiteY13" fmla="*/ 2697833 h 2697833"/>
+              <a:gd name="connsiteX14" fmla="*/ 0 w 2832322"/>
+              <a:gd name="connsiteY14" fmla="*/ 2697833 h 2697833"/>
+              <a:gd name="connsiteX15" fmla="*/ 12966 w 2832322"/>
+              <a:gd name="connsiteY15" fmla="*/ 2631781 h 2697833"/>
+              <a:gd name="connsiteX16" fmla="*/ 1052443 w 2832322"/>
+              <a:gd name="connsiteY16" fmla="*/ 1806313 h 2697833"/>
+              <a:gd name="connsiteX17" fmla="*/ 1721430 w 2832322"/>
+              <a:gd name="connsiteY17" fmla="*/ 1489397 h 2697833"/>
+              <a:gd name="connsiteX18" fmla="*/ 2115839 w 2832322"/>
+              <a:gd name="connsiteY18" fmla="*/ 696540 h 2697833"/>
+              <a:gd name="connsiteX19" fmla="*/ 2590689 w 2832322"/>
+              <a:gd name="connsiteY19" fmla="*/ 99461 h 2697833"/>
+              <a:gd name="connsiteX20" fmla="*/ 2730434 w 2832322"/>
+              <a:gd name="connsiteY20" fmla="*/ 32840 h 2697833"/>
+            </a:gdLst>
+            <a:ahLst/>
+            <a:cxnLst>
+              <a:cxn ang="0">
+                <a:pos x="connsiteX0" y="connsiteY0"/>
+              </a:cxn>
+              <a:cxn ang="0">
+                <a:pos x="connsiteX1" y="connsiteY1"/>
+              </a:cxn>
+              <a:cxn ang="0">
+                <a:pos x="connsiteX2" y="connsiteY2"/>
+              </a:cxn>
+              <a:cxn ang="0">
+                <a:pos x="connsiteX3" y="connsiteY3"/>
+              </a:cxn>
+              <a:cxn ang="0">
+                <a:pos x="connsiteX4" y="connsiteY4"/>
+              </a:cxn>
+              <a:cxn ang="0">
+                <a:pos x="connsiteX5" y="connsiteY5"/>
+              </a:cxn>
+              <a:cxn ang="0">
+                <a:pos x="connsiteX6" y="connsiteY6"/>
+              </a:cxn>
+              <a:cxn ang="0">
+                <a:pos x="connsiteX7" y="connsiteY7"/>
+              </a:cxn>
+              <a:cxn ang="0">
+                <a:pos x="connsiteX8" y="connsiteY8"/>
+              </a:cxn>
+              <a:cxn ang="0">
+                <a:pos x="connsiteX9" y="connsiteY9"/>
+              </a:cxn>
+              <a:cxn ang="0">
+                <a:pos x="connsiteX10" y="connsiteY10"/>
+              </a:cxn>
+              <a:cxn ang="0">
+                <a:pos x="connsiteX11" y="connsiteY11"/>
+              </a:cxn>
+              <a:cxn ang="0">
+                <a:pos x="connsiteX12" y="connsiteY12"/>
+              </a:cxn>
+              <a:cxn ang="0">
+                <a:pos x="connsiteX13" y="connsiteY13"/>
+              </a:cxn>
+              <a:cxn ang="0">
+                <a:pos x="connsiteX14" y="connsiteY14"/>
+              </a:cxn>
+              <a:cxn ang="0">
+                <a:pos x="connsiteX15" y="connsiteY15"/>
+              </a:cxn>
+              <a:cxn ang="0">
+                <a:pos x="connsiteX16" y="connsiteY16"/>
+              </a:cxn>
+              <a:cxn ang="0">
+                <a:pos x="connsiteX17" y="connsiteY17"/>
+              </a:cxn>
+              <a:cxn ang="0">
+                <a:pos x="connsiteX18" y="connsiteY18"/>
+              </a:cxn>
+              <a:cxn ang="0">
+                <a:pos x="connsiteX19" y="connsiteY19"/>
+              </a:cxn>
+              <a:cxn ang="0">
+                <a:pos x="connsiteX20" y="connsiteY20"/>
+              </a:cxn>
+            </a:cxnLst>
+            <a:rect l="l" t="t" r="r" b="b"/>
+            <a:pathLst>
+              <a:path w="2832322" h="2697833">
+                <a:moveTo>
+                  <a:pt x="638993" y="1429605"/>
+                </a:moveTo>
+                <a:cubicBezTo>
+                  <a:pt x="701328" y="1421871"/>
+                  <a:pt x="765121" y="1451183"/>
+                  <a:pt x="798503" y="1509001"/>
+                </a:cubicBezTo>
+                <a:cubicBezTo>
+                  <a:pt x="843012" y="1586093"/>
+                  <a:pt x="816599" y="1684670"/>
+                  <a:pt x="739507" y="1729178"/>
+                </a:cubicBezTo>
+                <a:cubicBezTo>
+                  <a:pt x="662415" y="1773688"/>
+                  <a:pt x="563838" y="1747275"/>
+                  <a:pt x="519329" y="1670181"/>
+                </a:cubicBezTo>
+                <a:cubicBezTo>
+                  <a:pt x="474820" y="1593091"/>
+                  <a:pt x="501234" y="1494514"/>
+                  <a:pt x="578327" y="1450005"/>
+                </a:cubicBezTo>
+                <a:cubicBezTo>
+                  <a:pt x="597599" y="1438878"/>
+                  <a:pt x="618215" y="1432183"/>
+                  <a:pt x="638993" y="1429605"/>
+                </a:cubicBezTo>
+                <a:close/>
+                <a:moveTo>
+                  <a:pt x="1252193" y="835524"/>
+                </a:moveTo>
+                <a:cubicBezTo>
+                  <a:pt x="1356532" y="842898"/>
+                  <a:pt x="1455464" y="900282"/>
+                  <a:pt x="1511699" y="997686"/>
+                </a:cubicBezTo>
+                <a:cubicBezTo>
+                  <a:pt x="1601677" y="1153532"/>
+                  <a:pt x="1548280" y="1352810"/>
+                  <a:pt x="1392436" y="1442788"/>
+                </a:cubicBezTo>
+                <a:cubicBezTo>
+                  <a:pt x="1236589" y="1532766"/>
+                  <a:pt x="1037311" y="1479369"/>
+                  <a:pt x="947333" y="1323523"/>
+                </a:cubicBezTo>
+                <a:cubicBezTo>
+                  <a:pt x="857356" y="1167678"/>
+                  <a:pt x="910753" y="968399"/>
+                  <a:pt x="1066598" y="878421"/>
+                </a:cubicBezTo>
+                <a:cubicBezTo>
+                  <a:pt x="1125040" y="844680"/>
+                  <a:pt x="1189590" y="831101"/>
+                  <a:pt x="1252193" y="835524"/>
+                </a:cubicBezTo>
+                <a:close/>
+                <a:moveTo>
+                  <a:pt x="2832322" y="0"/>
+                </a:moveTo>
+                <a:lnTo>
+                  <a:pt x="2832322" y="2697833"/>
+                </a:lnTo>
+                <a:lnTo>
+                  <a:pt x="0" y="2697833"/>
+                </a:lnTo>
+                <a:lnTo>
+                  <a:pt x="12966" y="2631781"/>
+                </a:lnTo>
+                <a:cubicBezTo>
+                  <a:pt x="140000" y="2184738"/>
+                  <a:pt x="505773" y="1908362"/>
+                  <a:pt x="1052443" y="1806313"/>
+                </a:cubicBezTo>
+                <a:cubicBezTo>
+                  <a:pt x="1303109" y="1759472"/>
+                  <a:pt x="1574698" y="1718763"/>
+                  <a:pt x="1721430" y="1489397"/>
+                </a:cubicBezTo>
+                <a:cubicBezTo>
+                  <a:pt x="1879597" y="1241842"/>
+                  <a:pt x="2005704" y="970478"/>
+                  <a:pt x="2115839" y="696540"/>
+                </a:cubicBezTo>
+                <a:cubicBezTo>
+                  <a:pt x="2216937" y="444582"/>
+                  <a:pt x="2354076" y="231931"/>
+                  <a:pt x="2590689" y="99461"/>
+                </a:cubicBezTo>
+                <a:cubicBezTo>
+                  <a:pt x="2637069" y="73498"/>
+                  <a:pt x="2683655" y="51402"/>
+                  <a:pt x="2730434" y="32840"/>
+                </a:cubicBezTo>
+                <a:close/>
+              </a:path>
+            </a:pathLst>
+          </a:custGeom>
+          <a:solidFill>
+            <a:schemeClr val="bg1"/>
+          </a:solidFill>
+          <a:ln>
+            <a:noFill/>
+          </a:ln>
+        </p:spPr>
+        <p:style>
+          <a:lnRef idx="2">
+            <a:schemeClr val="accent1">
+              <a:shade val="50000"/>
+            </a:schemeClr>
+          </a:lnRef>
+          <a:fillRef idx="1">
+            <a:schemeClr val="accent1"/>
+          </a:fillRef>
+          <a:effectRef idx="0">
+            <a:schemeClr val="accent1"/>
+          </a:effectRef>
+          <a:fontRef idx="minor">
+            <a:schemeClr val="lt1"/>
+          </a:fontRef>
+        </p:style>
+        <p:txBody>
+          <a:bodyPr wrap="square" rtlCol="0" anchor="ctr">
+            <a:noAutofit/>
+          </a:bodyPr>
+          <a:lstStyle/>
+          <a:p>
+            <a:pPr algn="ctr"/>
+            <a:endParaRPr lang="en-US"/>
+          </a:p>
+        </p:txBody>
+      </p:sp>
+      <p:sp>
+        <p:nvSpPr>
+          <p:cNvPr id="2" name="Titel 1">
+            <a:extLst>
+              <a:ext uri="{FF2B5EF4-FFF2-40B4-BE49-F238E27FC236}">
+                <a16:creationId xmlns:a16="http://schemas.microsoft.com/office/drawing/2014/main" id="{A17F7793-E54F-F9FF-F8C8-789A33CD7E1A}"/>
+              </a:ext>
+            </a:extLst>
+          </p:cNvPr>
+          <p:cNvSpPr>
+            <a:spLocks noGrp="1"/>
+          </p:cNvSpPr>
+          <p:nvPr>
+            <p:ph type="title"/>
+          </p:nvPr>
+        </p:nvSpPr>
+        <p:spPr>
+          <a:xfrm>
+            <a:off x="609600" y="552782"/>
+            <a:ext cx="6252839" cy="2172663"/>
+          </a:xfrm>
+        </p:spPr>
+        <p:txBody>
+          <a:bodyPr>
+            <a:normAutofit/>
+          </a:bodyPr>
+          <a:lstStyle/>
+          <a:p>
+            <a:r>
+              <a:rPr lang="de-DE" sz="3700" b="1" u="sng">
+                <a:cs typeface="Posterama"/>
+              </a:rPr>
+              <a:t>Segmentierung/Glättung</a:t>
+            </a:r>
+          </a:p>
+        </p:txBody>
+      </p:sp>
+      <p:sp>
+        <p:nvSpPr>
+          <p:cNvPr id="44" name="Inhaltsplatzhalter 10">
+            <a:extLst>
+              <a:ext uri="{FF2B5EF4-FFF2-40B4-BE49-F238E27FC236}">
+                <a16:creationId xmlns:a16="http://schemas.microsoft.com/office/drawing/2014/main" id="{9AF1DFE3-1A6E-D0F5-489E-A683E3AC8394}"/>
+              </a:ext>
+            </a:extLst>
+          </p:cNvPr>
+          <p:cNvSpPr>
+            <a:spLocks noGrp="1"/>
+          </p:cNvSpPr>
+          <p:nvPr>
+            <p:ph idx="1"/>
+          </p:nvPr>
+        </p:nvSpPr>
+        <p:spPr>
+          <a:xfrm>
+            <a:off x="610198" y="3241193"/>
+            <a:ext cx="6252840" cy="2978632"/>
+          </a:xfrm>
+        </p:spPr>
+        <p:txBody>
+          <a:bodyPr vert="horz" lIns="91440" tIns="45720" rIns="91440" bIns="45720" rtlCol="0" anchor="t">
+            <a:normAutofit/>
+          </a:bodyPr>
+          <a:lstStyle/>
+          <a:p>
+            <a:r>
+              <a:rPr lang="de-DE"/>
+              <a:t>Überlappende Fenster zur Glättung der Ausgabe:</a:t>
+            </a:r>
+          </a:p>
+          <a:p>
+            <a:pPr marL="457200" indent="-457200">
+              <a:buFontTx/>
+              <a:buChar char="-"/>
+            </a:pPr>
+            <a:r>
+              <a:rPr lang="de-DE"/>
+              <a:t>Unterteilung in beliebig lange Segmente</a:t>
+            </a:r>
+          </a:p>
+          <a:p>
+            <a:pPr marL="457200" indent="-457200">
+              <a:buFontTx/>
+              <a:buChar char="-"/>
+            </a:pPr>
+            <a:r>
+              <a:rPr lang="de-DE"/>
+              <a:t>Fenstergröße beliebig groß wählbar</a:t>
+            </a:r>
+          </a:p>
+          <a:p>
+            <a:pPr marL="457200" indent="-457200">
+              <a:buFontTx/>
+              <a:buChar char="-"/>
+            </a:pPr>
+            <a:r>
+              <a:rPr lang="de-DE"/>
+              <a:t>Glättung der einzelnen Segmente mittels Vor-/Nachgänger</a:t>
+            </a:r>
+          </a:p>
+          <a:p>
+            <a:pPr marL="457200" indent="-457200">
+              <a:buFontTx/>
+              <a:buChar char="-"/>
+            </a:pPr>
+            <a:endParaRPr lang="de-DE"/>
+          </a:p>
+        </p:txBody>
+      </p:sp>
+      <p:pic>
+        <p:nvPicPr>
+          <p:cNvPr id="4" name="Grafik 3">
+            <a:extLst>
+              <a:ext uri="{FF2B5EF4-FFF2-40B4-BE49-F238E27FC236}">
+                <a16:creationId xmlns:a16="http://schemas.microsoft.com/office/drawing/2014/main" id="{81461DF0-7BFC-B052-EF66-CAD9491E42B6}"/>
+              </a:ext>
+            </a:extLst>
+          </p:cNvPr>
+          <p:cNvPicPr>
+            <a:picLocks noChangeAspect="1"/>
+          </p:cNvPicPr>
+          <p:nvPr/>
+        </p:nvPicPr>
+        <p:blipFill>
+          <a:blip r:embed="rId2"/>
+          <a:stretch>
+            <a:fillRect/>
+          </a:stretch>
+        </p:blipFill>
+        <p:spPr>
+          <a:xfrm>
+            <a:off x="7851215" y="4385637"/>
+            <a:ext cx="4114800" cy="1018413"/>
+          </a:xfrm>
+          <a:prstGeom prst="rect">
+            <a:avLst/>
+          </a:prstGeom>
+        </p:spPr>
+      </p:pic>
+      <p:pic>
+        <p:nvPicPr>
+          <p:cNvPr id="13" name="Grafik 12" descr="Ein Bild, das Text, Schrift, Grafiken, Screenshot enthält.">
+            <a:extLst>
+              <a:ext uri="{FF2B5EF4-FFF2-40B4-BE49-F238E27FC236}">
+                <a16:creationId xmlns:a16="http://schemas.microsoft.com/office/drawing/2014/main" id="{67250A16-3D8D-A8C6-F19D-117FD002707E}"/>
+              </a:ext>
+            </a:extLst>
+          </p:cNvPr>
+          <p:cNvPicPr>
+            <a:picLocks noChangeAspect="1"/>
+          </p:cNvPicPr>
+          <p:nvPr/>
+        </p:nvPicPr>
+        <p:blipFill>
+          <a:blip r:embed="rId3"/>
+          <a:stretch>
+            <a:fillRect/>
+          </a:stretch>
+        </p:blipFill>
+        <p:spPr>
+          <a:xfrm>
+            <a:off x="7851215" y="1675287"/>
+            <a:ext cx="4114800" cy="740664"/>
+          </a:xfrm>
+          <a:prstGeom prst="rect">
+            <a:avLst/>
+          </a:prstGeom>
+        </p:spPr>
+      </p:pic>
+      <p:sp>
+        <p:nvSpPr>
+          <p:cNvPr id="6" name="Foliennummernplatzhalter 5">
+            <a:extLst>
+              <a:ext uri="{FF2B5EF4-FFF2-40B4-BE49-F238E27FC236}">
+                <a16:creationId xmlns:a16="http://schemas.microsoft.com/office/drawing/2014/main" id="{B8D9A034-94B9-14D5-800C-99F5F70F3CC2}"/>
+              </a:ext>
+            </a:extLst>
+          </p:cNvPr>
+          <p:cNvSpPr>
+            <a:spLocks noGrp="1"/>
+          </p:cNvSpPr>
+          <p:nvPr>
+            <p:ph type="sldNum" sz="quarter" idx="12"/>
+          </p:nvPr>
+        </p:nvSpPr>
+        <p:spPr>
+          <a:xfrm>
+            <a:off x="10134600" y="6356350"/>
+            <a:ext cx="1447800" cy="365125"/>
+          </a:xfrm>
+        </p:spPr>
+        <p:txBody>
+          <a:bodyPr>
+            <a:normAutofit/>
+          </a:bodyPr>
+          <a:lstStyle/>
+          <a:p>
+            <a:pPr>
+              <a:spcAft>
+                <a:spcPts val="600"/>
+              </a:spcAft>
+            </a:pPr>
+            <a:fld id="{1F646F3F-274D-499B-ABBE-824EB4ABDC3D}" type="slidenum">
+              <a:rPr lang="en-US" smtClean="0"/>
+              <a:pPr>
+                <a:spcAft>
+                  <a:spcPts val="600"/>
+                </a:spcAft>
+              </a:pPr>
+              <a:t>10</a:t>
+            </a:fld>
+            <a:endParaRPr lang="de-DE"/>
+          </a:p>
+        </p:txBody>
+      </p:sp>
+    </p:spTree>
+    <p:extLst>
+      <p:ext uri="{BB962C8B-B14F-4D97-AF65-F5344CB8AC3E}">
+        <p14:creationId xmlns:p14="http://schemas.microsoft.com/office/powerpoint/2010/main" val="3441322297"/>
+      </p:ext>
+    </p:extLst>
+  </p:cSld>
+  <p:clrMapOvr>
+    <a:masterClrMapping/>
+  </p:clrMapOvr>
+</p:sld>
+</file>
+
+<file path=ppt/slides/slide11.xml><?xml version="1.0" encoding="utf-8"?>
+<p:sld xmlns:a="http://schemas.openxmlformats.org/drawingml/2006/main" xmlns:r="http://schemas.openxmlformats.org/officeDocument/2006/relationships" xmlns:p="http://schemas.openxmlformats.org/presentationml/2006/main">
+  <p:cSld>
     <p:spTree>
       <p:nvGrpSpPr>
         <p:cNvPr id="1" name=""/>
@@ -4903,7 +5565,7 @@
           <a:p>
             <a:fld id="{1F646F3F-274D-499B-ABBE-824EB4ABDC3D}" type="slidenum">
               <a:rPr lang="en-US" smtClean="0"/>
-              <a:t>10</a:t>
+              <a:t>11</a:t>
             </a:fld>
             <a:endParaRPr lang="de-DE"/>
           </a:p>
@@ -5062,7 +5724,7 @@
 </p:sld>
 </file>
 
-<file path=ppt/slides/slide11.xml><?xml version="1.0" encoding="utf-8"?>
+<file path=ppt/slides/slide12.xml><?xml version="1.0" encoding="utf-8"?>
 <p:sld xmlns:a="http://schemas.openxmlformats.org/drawingml/2006/main" xmlns:r="http://schemas.openxmlformats.org/officeDocument/2006/relationships" xmlns:p="http://schemas.openxmlformats.org/presentationml/2006/main">
   <p:cSld>
     <p:spTree>
@@ -5154,7 +5816,7 @@
           <a:p>
             <a:fld id="{1F646F3F-274D-499B-ABBE-824EB4ABDC3D}" type="slidenum">
               <a:rPr lang="en-US" smtClean="0"/>
-              <a:t>11</a:t>
+              <a:t>12</a:t>
             </a:fld>
             <a:endParaRPr lang="de-DE"/>
           </a:p>
@@ -5200,84 +5862,6 @@
   <p:clrMapOvr>
     <a:masterClrMapping/>
   </p:clrMapOvr>
-  <p:timing>
-    <p:tnLst>
-      <p:par>
-        <p:cTn id="1" dur="indefinite" restart="never" nodeType="tmRoot">
-          <p:childTnLst>
-            <p:seq concurrent="1" nextAc="seek">
-              <p:cTn id="2" dur="indefinite" nodeType="mainSeq">
-                <p:childTnLst>
-                  <p:par>
-                    <p:cTn id="3" fill="hold">
-                      <p:stCondLst>
-                        <p:cond delay="indefinite"/>
-                      </p:stCondLst>
-                      <p:childTnLst>
-                        <p:par>
-                          <p:cTn id="4" fill="hold">
-                            <p:stCondLst>
-                              <p:cond delay="0"/>
-                            </p:stCondLst>
-                            <p:childTnLst>
-                              <p:par>
-                                <p:cTn id="5" presetID="1" presetClass="entr" presetSubtype="0" fill="hold" grpId="0" nodeType="clickEffect">
-                                  <p:stCondLst>
-                                    <p:cond delay="0"/>
-                                  </p:stCondLst>
-                                  <p:childTnLst>
-                                    <p:set>
-                                      <p:cBhvr>
-                                        <p:cTn id="6" dur="1" fill="hold">
-                                          <p:stCondLst>
-                                            <p:cond delay="249"/>
-                                          </p:stCondLst>
-                                        </p:cTn>
-                                        <p:tgtEl>
-                                          <p:spTgt spid="2"/>
-                                        </p:tgtEl>
-                                        <p:attrNameLst>
-                                          <p:attrName>style.visibility</p:attrName>
-                                        </p:attrNameLst>
-                                      </p:cBhvr>
-                                      <p:to>
-                                        <p:strVal val="visible"/>
-                                      </p:to>
-                                    </p:set>
-                                  </p:childTnLst>
-                                </p:cTn>
-                              </p:par>
-                            </p:childTnLst>
-                          </p:cTn>
-                        </p:par>
-                      </p:childTnLst>
-                    </p:cTn>
-                  </p:par>
-                </p:childTnLst>
-              </p:cTn>
-              <p:prevCondLst>
-                <p:cond evt="onPrev" delay="0">
-                  <p:tgtEl>
-                    <p:sldTgt/>
-                  </p:tgtEl>
-                </p:cond>
-              </p:prevCondLst>
-              <p:nextCondLst>
-                <p:cond evt="onNext" delay="0">
-                  <p:tgtEl>
-                    <p:sldTgt/>
-                  </p:tgtEl>
-                </p:cond>
-              </p:nextCondLst>
-            </p:seq>
-          </p:childTnLst>
-        </p:cTn>
-      </p:par>
-    </p:tnLst>
-    <p:bldLst>
-      <p:bldP spid="2" grpId="0"/>
-    </p:bldLst>
-  </p:timing>
 </p:sld>
 </file>
 
@@ -6538,7 +7122,13 @@
   <p:cSld>
     <p:spTree>
       <p:nvGrpSpPr>
-        <p:cNvPr id="1" name=""/>
+        <p:cNvPr id="1" name="">
+          <a:extLst>
+            <a:ext uri="{FF2B5EF4-FFF2-40B4-BE49-F238E27FC236}">
+              <a16:creationId xmlns:a16="http://schemas.microsoft.com/office/drawing/2014/main" id="{11A75C80-285E-6E8A-2170-BD1D8F1E61E9}"/>
+            </a:ext>
+          </a:extLst>
+        </p:cNvPr>
         <p:cNvGrpSpPr/>
         <p:nvPr/>
       </p:nvGrpSpPr>
@@ -6555,7 +7145,7 @@
           <p:cNvPr id="2" name="Titel 1">
             <a:extLst>
               <a:ext uri="{FF2B5EF4-FFF2-40B4-BE49-F238E27FC236}">
-                <a16:creationId xmlns:a16="http://schemas.microsoft.com/office/drawing/2014/main" id="{5F927641-F6B1-1C11-381B-D4E3D37285D2}"/>
+                <a16:creationId xmlns:a16="http://schemas.microsoft.com/office/drawing/2014/main" id="{7935F30F-D740-A2FF-8F3C-F2F875EC988E}"/>
               </a:ext>
             </a:extLst>
           </p:cNvPr>
@@ -6573,9 +7163,10 @@
           <a:p>
             <a:r>
               <a:rPr lang="de-DE" b="1" u="sng" dirty="0">
+                <a:latin typeface="Lucida Bright"/>
                 <a:cs typeface="Posterama"/>
               </a:rPr>
-              <a:t>Stand SVM</a:t>
+              <a:t>Aufbau SVM</a:t>
             </a:r>
           </a:p>
         </p:txBody>
@@ -6585,7 +7176,7 @@
           <p:cNvPr id="6" name="Foliennummernplatzhalter 5">
             <a:extLst>
               <a:ext uri="{FF2B5EF4-FFF2-40B4-BE49-F238E27FC236}">
-                <a16:creationId xmlns:a16="http://schemas.microsoft.com/office/drawing/2014/main" id="{0A1D13E5-5CD6-4D9B-103E-82BE5D070BD1}"/>
+                <a16:creationId xmlns:a16="http://schemas.microsoft.com/office/drawing/2014/main" id="{313BD3B3-DDF8-1137-5798-B8086E538E8E}"/>
               </a:ext>
             </a:extLst>
           </p:cNvPr>
@@ -6614,7 +7205,7 @@
           <p:cNvPr id="13" name="Grafik 12" descr="Ein Bild, das Text, Schrift, Grafiken, Screenshot enthält.">
             <a:extLst>
               <a:ext uri="{FF2B5EF4-FFF2-40B4-BE49-F238E27FC236}">
-                <a16:creationId xmlns:a16="http://schemas.microsoft.com/office/drawing/2014/main" id="{5333A9AD-A782-28E0-CF2E-35C52F9795F3}"/>
+                <a16:creationId xmlns:a16="http://schemas.microsoft.com/office/drawing/2014/main" id="{CED970B2-FE34-0817-4747-8C1F34D40774}"/>
               </a:ext>
             </a:extLst>
           </p:cNvPr>
@@ -6639,97 +7230,85 @@
           </a:prstGeom>
         </p:spPr>
       </p:pic>
-      <p:pic>
-        <p:nvPicPr>
-          <p:cNvPr id="3" name="Grafik 2" descr="Ein Bild, das Text, Screenshot, Diagramm, Rechteck enthält.&#10;&#10;Beschreibung automatisch generiert.">
-            <a:extLst>
-              <a:ext uri="{FF2B5EF4-FFF2-40B4-BE49-F238E27FC236}">
-                <a16:creationId xmlns:a16="http://schemas.microsoft.com/office/drawing/2014/main" id="{61228266-A1A0-4734-54AE-3A5BE2CBCFF6}"/>
-              </a:ext>
-            </a:extLst>
-          </p:cNvPr>
-          <p:cNvPicPr>
-            <a:picLocks noChangeAspect="1"/>
-          </p:cNvPicPr>
-          <p:nvPr/>
-        </p:nvPicPr>
-        <p:blipFill>
-          <a:blip r:embed="rId3"/>
-          <a:srcRect t="7669" b="7669"/>
-          <a:stretch/>
-        </p:blipFill>
+      <p:sp>
+        <p:nvSpPr>
+          <p:cNvPr id="9" name="Inhaltsplatzhalter 10">
+            <a:extLst>
+              <a:ext uri="{FF2B5EF4-FFF2-40B4-BE49-F238E27FC236}">
+                <a16:creationId xmlns:a16="http://schemas.microsoft.com/office/drawing/2014/main" id="{B087DA7B-6508-4CB0-6707-2F54F659CCF9}"/>
+              </a:ext>
+            </a:extLst>
+          </p:cNvPr>
+          <p:cNvSpPr>
+            <a:spLocks noGrp="1"/>
+          </p:cNvSpPr>
+          <p:nvPr>
+            <p:ph idx="1"/>
+          </p:nvPr>
+        </p:nvSpPr>
         <p:spPr>
           <a:xfrm>
-            <a:off x="609409" y="2308129"/>
-            <a:ext cx="4816865" cy="3272762"/>
+            <a:off x="609599" y="2106205"/>
+            <a:ext cx="7515755" cy="4528638"/>
           </a:xfrm>
-          <a:prstGeom prst="rect">
-            <a:avLst/>
-          </a:prstGeom>
         </p:spPr>
-      </p:pic>
-      <p:pic>
-        <p:nvPicPr>
-          <p:cNvPr id="4" name="Grafik 3" descr="Ein Bild, das Text, Diagramm, Screenshot, Reihe enthält.&#10;&#10;Beschreibung automatisch generiert.">
-            <a:extLst>
-              <a:ext uri="{FF2B5EF4-FFF2-40B4-BE49-F238E27FC236}">
-                <a16:creationId xmlns:a16="http://schemas.microsoft.com/office/drawing/2014/main" id="{2ABD9218-3D50-D822-23AC-A985DEECEED5}"/>
-              </a:ext>
-            </a:extLst>
-          </p:cNvPr>
-          <p:cNvPicPr>
-            <a:picLocks noChangeAspect="1"/>
-          </p:cNvPicPr>
-          <p:nvPr/>
-        </p:nvPicPr>
-        <p:blipFill>
-          <a:blip r:embed="rId4"/>
-          <a:srcRect l="402" t="-2144" r="-5544" b="3480"/>
-          <a:stretch/>
-        </p:blipFill>
-        <p:spPr>
-          <a:xfrm>
-            <a:off x="5926863" y="1390375"/>
-            <a:ext cx="6099154" cy="4702574"/>
-          </a:xfrm>
-          <a:prstGeom prst="rect">
-            <a:avLst/>
-          </a:prstGeom>
-        </p:spPr>
-      </p:pic>
-      <p:pic>
-        <p:nvPicPr>
-          <p:cNvPr id="5" name="Grafik 4" descr="Ein Bild, das Text, Screenshot, Schrift enthält.&#10;&#10;Beschreibung automatisch generiert.">
-            <a:extLst>
-              <a:ext uri="{FF2B5EF4-FFF2-40B4-BE49-F238E27FC236}">
-                <a16:creationId xmlns:a16="http://schemas.microsoft.com/office/drawing/2014/main" id="{869B3BF8-09E7-FA27-8FCE-387DACEACDF7}"/>
-              </a:ext>
-            </a:extLst>
-          </p:cNvPr>
-          <p:cNvPicPr>
-            <a:picLocks noChangeAspect="1"/>
-          </p:cNvPicPr>
-          <p:nvPr/>
-        </p:nvPicPr>
-        <p:blipFill>
-          <a:blip r:embed="rId5"/>
-          <a:srcRect l="-21" t="21011" r="2183" b="-81"/>
-          <a:stretch/>
-        </p:blipFill>
-        <p:spPr>
-          <a:xfrm>
-            <a:off x="4732289" y="5986010"/>
-            <a:ext cx="5964235" cy="1747562"/>
-          </a:xfrm>
-          <a:prstGeom prst="rect">
-            <a:avLst/>
-          </a:prstGeom>
-        </p:spPr>
-      </p:pic>
+        <p:txBody>
+          <a:bodyPr vert="horz" lIns="91440" tIns="45720" rIns="91440" bIns="45720" rtlCol="0" anchor="t">
+            <a:normAutofit/>
+          </a:bodyPr>
+          <a:lstStyle/>
+          <a:p>
+            <a:pPr marL="514350" indent="-514350">
+              <a:buAutoNum type="arabicPeriod"/>
+            </a:pPr>
+            <a:r>
+              <a:rPr lang="de-DE" sz="2800" dirty="0">
+                <a:cs typeface="Arial"/>
+              </a:rPr>
+              <a:t>Input </a:t>
+            </a:r>
+            <a:endParaRPr lang="de-DE" dirty="0"/>
+          </a:p>
+          <a:p>
+            <a:pPr marL="514350" indent="-514350">
+              <a:buAutoNum type="arabicPeriod"/>
+            </a:pPr>
+            <a:r>
+              <a:rPr lang="de-DE" sz="2800" dirty="0">
+                <a:cs typeface="Arial"/>
+              </a:rPr>
+              <a:t> Features-Extraktion (1D-Array)</a:t>
+            </a:r>
+            <a:endParaRPr lang="de-DE" dirty="0"/>
+          </a:p>
+          <a:p>
+            <a:pPr marL="514350" indent="-514350">
+              <a:buAutoNum type="arabicPeriod"/>
+            </a:pPr>
+            <a:r>
+              <a:rPr lang="de-DE" sz="2800" dirty="0">
+                <a:cs typeface="Arial"/>
+              </a:rPr>
+              <a:t>Modelltraining und Parameter-Tuning</a:t>
+            </a:r>
+          </a:p>
+          <a:p>
+            <a:pPr marL="514350" indent="-514350">
+              <a:buAutoNum type="arabicPeriod"/>
+            </a:pPr>
+            <a:r>
+              <a:rPr lang="de-DE" sz="2800" dirty="0">
+                <a:cs typeface="Arial"/>
+              </a:rPr>
+              <a:t>Modellbewertung und Visualisierung</a:t>
+            </a:r>
+          </a:p>
+        </p:txBody>
+      </p:sp>
     </p:spTree>
     <p:extLst>
       <p:ext uri="{BB962C8B-B14F-4D97-AF65-F5344CB8AC3E}">
-        <p14:creationId xmlns:p14="http://schemas.microsoft.com/office/powerpoint/2010/main" val="4019152564"/>
+        <p14:creationId xmlns:p14="http://schemas.microsoft.com/office/powerpoint/2010/main" val="4010389218"/>
       </p:ext>
     </p:extLst>
   </p:cSld>
@@ -6772,16 +7351,27 @@
             <p:ph type="title"/>
           </p:nvPr>
         </p:nvSpPr>
-        <p:spPr/>
+        <p:spPr>
+          <a:xfrm>
+            <a:off x="609600" y="557784"/>
+            <a:ext cx="5481918" cy="1325563"/>
+          </a:xfrm>
+        </p:spPr>
         <p:txBody>
           <a:bodyPr/>
           <a:lstStyle/>
           <a:p>
+            <a:r>
+              <a:rPr lang="de-DE" b="1" u="sng" dirty="0" err="1">
+                <a:cs typeface="Posterama"/>
+              </a:rPr>
+              <a:t>Trainning</a:t>
+            </a:r>
             <a:r>
               <a:rPr lang="de-DE" b="1" u="sng" dirty="0">
                 <a:cs typeface="Posterama"/>
               </a:rPr>
-              <a:t>Stand SVM</a:t>
+              <a:t> SVM</a:t>
             </a:r>
           </a:p>
         </p:txBody>
@@ -6847,7 +7437,7 @@
       </p:pic>
       <p:pic>
         <p:nvPicPr>
-          <p:cNvPr id="3" name="Grafik 2" descr="Ein Bild, das Text, Reihe, Diagramm, Screenshot enthält.&#10;&#10;Beschreibung automatisch generiert.">
+          <p:cNvPr id="3" name="Grafik 2" descr="Ein Bild, das Text, Screenshot, Software, Schrift enthält.&#10;&#10;Beschreibung automatisch generiert.">
             <a:extLst>
               <a:ext uri="{FF2B5EF4-FFF2-40B4-BE49-F238E27FC236}">
                 <a16:creationId xmlns:a16="http://schemas.microsoft.com/office/drawing/2014/main" id="{61228266-A1A0-4734-54AE-3A5BE2CBCFF6}"/>
@@ -6861,13 +7451,13 @@
         </p:nvPicPr>
         <p:blipFill>
           <a:blip r:embed="rId3"/>
-          <a:srcRect t="1966" b="-4354"/>
+          <a:srcRect l="-12" t="3666" r="5966" b="262"/>
           <a:stretch/>
         </p:blipFill>
         <p:spPr>
           <a:xfrm>
-            <a:off x="609409" y="2128212"/>
-            <a:ext cx="4816865" cy="3853205"/>
+            <a:off x="456361" y="2042012"/>
+            <a:ext cx="6708448" cy="3807606"/>
           </a:xfrm>
           <a:prstGeom prst="rect">
             <a:avLst/>
@@ -6876,10 +7466,10 @@
       </p:pic>
       <p:pic>
         <p:nvPicPr>
-          <p:cNvPr id="4" name="Grafik 3" descr="Ein Bild, das Text, Screenshot, Display, Rechteck enthält.&#10;&#10;Beschreibung automatisch generiert.">
-            <a:extLst>
-              <a:ext uri="{FF2B5EF4-FFF2-40B4-BE49-F238E27FC236}">
-                <a16:creationId xmlns:a16="http://schemas.microsoft.com/office/drawing/2014/main" id="{2ABD9218-3D50-D822-23AC-A985DEECEED5}"/>
+          <p:cNvPr id="5" name="Grafik 4" descr="Ein Bild, das Text, Screenshot, Schrift enthält.&#10;&#10;Beschreibung automatisch generiert.">
+            <a:extLst>
+              <a:ext uri="{FF2B5EF4-FFF2-40B4-BE49-F238E27FC236}">
+                <a16:creationId xmlns:a16="http://schemas.microsoft.com/office/drawing/2014/main" id="{2DEBDD4F-39F3-F00C-538A-E207A6B09884}"/>
               </a:ext>
             </a:extLst>
           </p:cNvPr>
@@ -6890,13 +7480,14 @@
         </p:nvPicPr>
         <p:blipFill>
           <a:blip r:embed="rId4"/>
-          <a:srcRect l="1069" r="1069"/>
-          <a:stretch/>
+          <a:stretch>
+            <a:fillRect/>
+          </a:stretch>
         </p:blipFill>
         <p:spPr>
           <a:xfrm>
-            <a:off x="5672863" y="1580875"/>
-            <a:ext cx="6099154" cy="4945990"/>
+            <a:off x="7162800" y="3235330"/>
+            <a:ext cx="4680858" cy="2629798"/>
           </a:xfrm>
           <a:prstGeom prst="rect">
             <a:avLst/>
@@ -6906,7 +7497,7 @@
     </p:spTree>
     <p:extLst>
       <p:ext uri="{BB962C8B-B14F-4D97-AF65-F5344CB8AC3E}">
-        <p14:creationId xmlns:p14="http://schemas.microsoft.com/office/powerpoint/2010/main" val="4075924249"/>
+        <p14:creationId xmlns:p14="http://schemas.microsoft.com/office/powerpoint/2010/main" val="1023119366"/>
       </p:ext>
     </p:extLst>
   </p:cSld>
@@ -6955,10 +7546,16 @@
           <a:lstStyle/>
           <a:p>
             <a:r>
+              <a:rPr lang="de-DE" b="1" u="sng" dirty="0" err="1">
+                <a:cs typeface="Posterama"/>
+              </a:rPr>
+              <a:t>Tranning</a:t>
+            </a:r>
+            <a:r>
               <a:rPr lang="de-DE" b="1" u="sng" dirty="0">
                 <a:cs typeface="Posterama"/>
               </a:rPr>
-              <a:t>Stand SVM</a:t>
+              <a:t> SVM</a:t>
             </a:r>
           </a:p>
         </p:txBody>
@@ -7024,7 +7621,7 @@
       </p:pic>
       <p:pic>
         <p:nvPicPr>
-          <p:cNvPr id="3" name="Grafik 2" descr="Ein Bild, das Text, Screenshot, Schrift enthält.&#10;&#10;Beschreibung automatisch generiert.">
+          <p:cNvPr id="3" name="Grafik 2" descr="Ein Bild, das Text, Screenshot, Diagramm, Rechteck enthält.&#10;&#10;Beschreibung automatisch generiert.">
             <a:extLst>
               <a:ext uri="{FF2B5EF4-FFF2-40B4-BE49-F238E27FC236}">
                 <a16:creationId xmlns:a16="http://schemas.microsoft.com/office/drawing/2014/main" id="{61228266-A1A0-4734-54AE-3A5BE2CBCFF6}"/>
@@ -7038,13 +7635,42 @@
         </p:nvPicPr>
         <p:blipFill>
           <a:blip r:embed="rId3"/>
-          <a:srcRect t="883" b="883"/>
+          <a:srcRect t="7536"/>
           <a:stretch/>
         </p:blipFill>
         <p:spPr>
           <a:xfrm>
-            <a:off x="3943159" y="1270963"/>
-            <a:ext cx="6912364" cy="5271370"/>
+            <a:off x="609409" y="2308129"/>
+            <a:ext cx="4816869" cy="3574333"/>
+          </a:xfrm>
+          <a:prstGeom prst="rect">
+            <a:avLst/>
+          </a:prstGeom>
+        </p:spPr>
+      </p:pic>
+      <p:pic>
+        <p:nvPicPr>
+          <p:cNvPr id="7" name="Grafik 6" descr="Ein Bild, das Text, Reihe, Screenshot, Diagramm enthält.&#10;&#10;Beschreibung automatisch generiert.">
+            <a:extLst>
+              <a:ext uri="{FF2B5EF4-FFF2-40B4-BE49-F238E27FC236}">
+                <a16:creationId xmlns:a16="http://schemas.microsoft.com/office/drawing/2014/main" id="{E3EB0EA0-13DE-DEB3-65E9-976C74800921}"/>
+              </a:ext>
+            </a:extLst>
+          </p:cNvPr>
+          <p:cNvPicPr>
+            <a:picLocks noChangeAspect="1"/>
+          </p:cNvPicPr>
+          <p:nvPr/>
+        </p:nvPicPr>
+        <p:blipFill>
+          <a:blip r:embed="rId4"/>
+          <a:srcRect l="2786" t="84" r="-211" b="2307"/>
+          <a:stretch/>
+        </p:blipFill>
+        <p:spPr>
+          <a:xfrm>
+            <a:off x="6091913" y="2305158"/>
+            <a:ext cx="5187878" cy="3579363"/>
           </a:xfrm>
           <a:prstGeom prst="rect">
             <a:avLst/>
@@ -7054,7 +7680,7 @@
     </p:spTree>
     <p:extLst>
       <p:ext uri="{BB962C8B-B14F-4D97-AF65-F5344CB8AC3E}">
-        <p14:creationId xmlns:p14="http://schemas.microsoft.com/office/powerpoint/2010/main" val="1023119366"/>
+        <p14:creationId xmlns:p14="http://schemas.microsoft.com/office/powerpoint/2010/main" val="4019152564"/>
       </p:ext>
     </p:extLst>
   </p:cSld>
@@ -7067,23 +7693,9 @@
 <file path=ppt/slides/slide9.xml><?xml version="1.0" encoding="utf-8"?>
 <p:sld xmlns:a="http://schemas.openxmlformats.org/drawingml/2006/main" xmlns:r="http://schemas.openxmlformats.org/officeDocument/2006/relationships" xmlns:p="http://schemas.openxmlformats.org/presentationml/2006/main">
   <p:cSld>
-    <p:bg>
-      <p:bgPr>
-        <a:solidFill>
-          <a:schemeClr val="bg2"/>
-        </a:solidFill>
-        <a:effectLst/>
-      </p:bgPr>
-    </p:bg>
     <p:spTree>
       <p:nvGrpSpPr>
-        <p:cNvPr id="1" name="">
-          <a:extLst>
-            <a:ext uri="{FF2B5EF4-FFF2-40B4-BE49-F238E27FC236}">
-              <a16:creationId xmlns:a16="http://schemas.microsoft.com/office/drawing/2014/main" id="{E6DA0CC2-0F59-2C11-06FA-CF839DEC99A6}"/>
-            </a:ext>
-          </a:extLst>
-        </p:cNvPr>
+        <p:cNvPr id="1" name=""/>
         <p:cNvGrpSpPr/>
         <p:nvPr/>
       </p:nvGrpSpPr>
@@ -7095,413 +7707,12 @@
           <a:chExt cx="0" cy="0"/>
         </a:xfrm>
       </p:grpSpPr>
-      <p:sp useBgFill="1">
-        <p:nvSpPr>
-          <p:cNvPr id="18" name="Background Fill">
-            <a:extLst>
-              <a:ext uri="{FF2B5EF4-FFF2-40B4-BE49-F238E27FC236}">
-                <a16:creationId xmlns:a16="http://schemas.microsoft.com/office/drawing/2014/main" id="{B937640E-EF7A-4A6C-A950-D12B7D5C923E}"/>
-              </a:ext>
-              <a:ext uri="{C183D7F6-B498-43B3-948B-1728B52AA6E4}">
-                <adec:decorative xmlns:adec="http://schemas.microsoft.com/office/drawing/2017/decorative" val="1"/>
-              </a:ext>
-            </a:extLst>
-          </p:cNvPr>
-          <p:cNvSpPr>
-            <a:spLocks noGrp="1" noRot="1" noChangeAspect="1" noMove="1" noResize="1" noEditPoints="1" noAdjustHandles="1" noChangeArrowheads="1" noChangeShapeType="1" noTextEdit="1"/>
-          </p:cNvSpPr>
-          <p:nvPr>
-            <p:extLst>
-              <p:ext uri="{386F3935-93C4-4BCD-93E2-E3B085C9AB24}">
-                <p16:designElem xmlns:p16="http://schemas.microsoft.com/office/powerpoint/2015/main" val="1"/>
-              </p:ext>
-            </p:extLst>
-          </p:nvPr>
-        </p:nvSpPr>
-        <p:spPr>
-          <a:xfrm>
-            <a:off x="0" y="0"/>
-            <a:ext cx="12188952" cy="6858000"/>
-          </a:xfrm>
-          <a:prstGeom prst="rect">
-            <a:avLst/>
-          </a:prstGeom>
-          <a:ln>
-            <a:noFill/>
-          </a:ln>
-        </p:spPr>
-        <p:style>
-          <a:lnRef idx="2">
-            <a:schemeClr val="accent1">
-              <a:shade val="50000"/>
-            </a:schemeClr>
-          </a:lnRef>
-          <a:fillRef idx="1">
-            <a:schemeClr val="accent1"/>
-          </a:fillRef>
-          <a:effectRef idx="0">
-            <a:schemeClr val="accent1"/>
-          </a:effectRef>
-          <a:fontRef idx="minor">
-            <a:schemeClr val="lt1"/>
-          </a:fontRef>
-        </p:style>
-        <p:txBody>
-          <a:bodyPr rtlCol="0" anchor="ctr"/>
-          <a:lstStyle/>
-          <a:p>
-            <a:pPr algn="ctr"/>
-            <a:endParaRPr lang="en-US"/>
-          </a:p>
-        </p:txBody>
-      </p:sp>
-      <p:sp>
-        <p:nvSpPr>
-          <p:cNvPr id="20" name="Rectangle 19">
-            <a:extLst>
-              <a:ext uri="{FF2B5EF4-FFF2-40B4-BE49-F238E27FC236}">
-                <a16:creationId xmlns:a16="http://schemas.microsoft.com/office/drawing/2014/main" id="{961DDC38-D3E1-447D-8E7A-F1FB7A61351B}"/>
-              </a:ext>
-              <a:ext uri="{C183D7F6-B498-43B3-948B-1728B52AA6E4}">
-                <adec:decorative xmlns:adec="http://schemas.microsoft.com/office/drawing/2017/decorative" val="1"/>
-              </a:ext>
-            </a:extLst>
-          </p:cNvPr>
-          <p:cNvSpPr>
-            <a:spLocks noGrp="1" noRot="1" noChangeAspect="1" noMove="1" noResize="1" noEditPoints="1" noAdjustHandles="1" noChangeArrowheads="1" noChangeShapeType="1" noTextEdit="1"/>
-          </p:cNvSpPr>
-          <p:nvPr>
-            <p:extLst>
-              <p:ext uri="{386F3935-93C4-4BCD-93E2-E3B085C9AB24}">
-                <p16:designElem xmlns:p16="http://schemas.microsoft.com/office/powerpoint/2015/main" val="1"/>
-              </p:ext>
-            </p:extLst>
-          </p:nvPr>
-        </p:nvSpPr>
-        <p:spPr>
-          <a:xfrm>
-            <a:off x="0" y="0"/>
-            <a:ext cx="12192001" cy="6858000"/>
-          </a:xfrm>
-          <a:prstGeom prst="rect">
-            <a:avLst/>
-          </a:prstGeom>
-          <a:solidFill>
-            <a:srgbClr val="AEAEAE">
-              <a:alpha val="10000"/>
-            </a:srgbClr>
-          </a:solidFill>
-          <a:ln>
-            <a:noFill/>
-          </a:ln>
-        </p:spPr>
-        <p:style>
-          <a:lnRef idx="2">
-            <a:schemeClr val="accent1">
-              <a:shade val="50000"/>
-            </a:schemeClr>
-          </a:lnRef>
-          <a:fillRef idx="1">
-            <a:schemeClr val="accent1"/>
-          </a:fillRef>
-          <a:effectRef idx="0">
-            <a:schemeClr val="accent1"/>
-          </a:effectRef>
-          <a:fontRef idx="minor">
-            <a:schemeClr val="lt1"/>
-          </a:fontRef>
-        </p:style>
-        <p:txBody>
-          <a:bodyPr rtlCol="0" anchor="ctr"/>
-          <a:lstStyle/>
-          <a:p>
-            <a:pPr algn="ctr"/>
-            <a:endParaRPr lang="en-US" dirty="0"/>
-          </a:p>
-        </p:txBody>
-      </p:sp>
-      <p:sp>
-        <p:nvSpPr>
-          <p:cNvPr id="22" name="Freeform: Shape 21">
-            <a:extLst>
-              <a:ext uri="{FF2B5EF4-FFF2-40B4-BE49-F238E27FC236}">
-                <a16:creationId xmlns:a16="http://schemas.microsoft.com/office/drawing/2014/main" id="{FC7A5CC7-A1F9-46CC-BAC8-46E258CD3E10}"/>
-              </a:ext>
-              <a:ext uri="{C183D7F6-B498-43B3-948B-1728B52AA6E4}">
-                <adec:decorative xmlns:adec="http://schemas.microsoft.com/office/drawing/2017/decorative" val="1"/>
-              </a:ext>
-            </a:extLst>
-          </p:cNvPr>
-          <p:cNvSpPr>
-            <a:spLocks noGrp="1" noRot="1" noChangeAspect="1" noMove="1" noResize="1" noEditPoints="1" noAdjustHandles="1" noChangeArrowheads="1" noChangeShapeType="1" noTextEdit="1"/>
-          </p:cNvSpPr>
-          <p:nvPr>
-            <p:extLst>
-              <p:ext uri="{386F3935-93C4-4BCD-93E2-E3B085C9AB24}">
-                <p16:designElem xmlns:p16="http://schemas.microsoft.com/office/powerpoint/2015/main" val="1"/>
-              </p:ext>
-            </p:extLst>
-          </p:nvPr>
-        </p:nvSpPr>
-        <p:spPr>
-          <a:xfrm>
-            <a:off x="9356630" y="4160168"/>
-            <a:ext cx="2832322" cy="2697833"/>
-          </a:xfrm>
-          <a:custGeom>
-            <a:avLst/>
-            <a:gdLst>
-              <a:gd name="connsiteX0" fmla="*/ 638993 w 2832322"/>
-              <a:gd name="connsiteY0" fmla="*/ 1429605 h 2697833"/>
-              <a:gd name="connsiteX1" fmla="*/ 798503 w 2832322"/>
-              <a:gd name="connsiteY1" fmla="*/ 1509001 h 2697833"/>
-              <a:gd name="connsiteX2" fmla="*/ 739507 w 2832322"/>
-              <a:gd name="connsiteY2" fmla="*/ 1729178 h 2697833"/>
-              <a:gd name="connsiteX3" fmla="*/ 519329 w 2832322"/>
-              <a:gd name="connsiteY3" fmla="*/ 1670181 h 2697833"/>
-              <a:gd name="connsiteX4" fmla="*/ 578327 w 2832322"/>
-              <a:gd name="connsiteY4" fmla="*/ 1450005 h 2697833"/>
-              <a:gd name="connsiteX5" fmla="*/ 638993 w 2832322"/>
-              <a:gd name="connsiteY5" fmla="*/ 1429605 h 2697833"/>
-              <a:gd name="connsiteX6" fmla="*/ 1252193 w 2832322"/>
-              <a:gd name="connsiteY6" fmla="*/ 835524 h 2697833"/>
-              <a:gd name="connsiteX7" fmla="*/ 1511699 w 2832322"/>
-              <a:gd name="connsiteY7" fmla="*/ 997686 h 2697833"/>
-              <a:gd name="connsiteX8" fmla="*/ 1392436 w 2832322"/>
-              <a:gd name="connsiteY8" fmla="*/ 1442788 h 2697833"/>
-              <a:gd name="connsiteX9" fmla="*/ 947333 w 2832322"/>
-              <a:gd name="connsiteY9" fmla="*/ 1323523 h 2697833"/>
-              <a:gd name="connsiteX10" fmla="*/ 1066598 w 2832322"/>
-              <a:gd name="connsiteY10" fmla="*/ 878421 h 2697833"/>
-              <a:gd name="connsiteX11" fmla="*/ 1252193 w 2832322"/>
-              <a:gd name="connsiteY11" fmla="*/ 835524 h 2697833"/>
-              <a:gd name="connsiteX12" fmla="*/ 2832322 w 2832322"/>
-              <a:gd name="connsiteY12" fmla="*/ 0 h 2697833"/>
-              <a:gd name="connsiteX13" fmla="*/ 2832322 w 2832322"/>
-              <a:gd name="connsiteY13" fmla="*/ 2697833 h 2697833"/>
-              <a:gd name="connsiteX14" fmla="*/ 0 w 2832322"/>
-              <a:gd name="connsiteY14" fmla="*/ 2697833 h 2697833"/>
-              <a:gd name="connsiteX15" fmla="*/ 12966 w 2832322"/>
-              <a:gd name="connsiteY15" fmla="*/ 2631781 h 2697833"/>
-              <a:gd name="connsiteX16" fmla="*/ 1052443 w 2832322"/>
-              <a:gd name="connsiteY16" fmla="*/ 1806313 h 2697833"/>
-              <a:gd name="connsiteX17" fmla="*/ 1721430 w 2832322"/>
-              <a:gd name="connsiteY17" fmla="*/ 1489397 h 2697833"/>
-              <a:gd name="connsiteX18" fmla="*/ 2115839 w 2832322"/>
-              <a:gd name="connsiteY18" fmla="*/ 696540 h 2697833"/>
-              <a:gd name="connsiteX19" fmla="*/ 2590689 w 2832322"/>
-              <a:gd name="connsiteY19" fmla="*/ 99461 h 2697833"/>
-              <a:gd name="connsiteX20" fmla="*/ 2730434 w 2832322"/>
-              <a:gd name="connsiteY20" fmla="*/ 32840 h 2697833"/>
-            </a:gdLst>
-            <a:ahLst/>
-            <a:cxnLst>
-              <a:cxn ang="0">
-                <a:pos x="connsiteX0" y="connsiteY0"/>
-              </a:cxn>
-              <a:cxn ang="0">
-                <a:pos x="connsiteX1" y="connsiteY1"/>
-              </a:cxn>
-              <a:cxn ang="0">
-                <a:pos x="connsiteX2" y="connsiteY2"/>
-              </a:cxn>
-              <a:cxn ang="0">
-                <a:pos x="connsiteX3" y="connsiteY3"/>
-              </a:cxn>
-              <a:cxn ang="0">
-                <a:pos x="connsiteX4" y="connsiteY4"/>
-              </a:cxn>
-              <a:cxn ang="0">
-                <a:pos x="connsiteX5" y="connsiteY5"/>
-              </a:cxn>
-              <a:cxn ang="0">
-                <a:pos x="connsiteX6" y="connsiteY6"/>
-              </a:cxn>
-              <a:cxn ang="0">
-                <a:pos x="connsiteX7" y="connsiteY7"/>
-              </a:cxn>
-              <a:cxn ang="0">
-                <a:pos x="connsiteX8" y="connsiteY8"/>
-              </a:cxn>
-              <a:cxn ang="0">
-                <a:pos x="connsiteX9" y="connsiteY9"/>
-              </a:cxn>
-              <a:cxn ang="0">
-                <a:pos x="connsiteX10" y="connsiteY10"/>
-              </a:cxn>
-              <a:cxn ang="0">
-                <a:pos x="connsiteX11" y="connsiteY11"/>
-              </a:cxn>
-              <a:cxn ang="0">
-                <a:pos x="connsiteX12" y="connsiteY12"/>
-              </a:cxn>
-              <a:cxn ang="0">
-                <a:pos x="connsiteX13" y="connsiteY13"/>
-              </a:cxn>
-              <a:cxn ang="0">
-                <a:pos x="connsiteX14" y="connsiteY14"/>
-              </a:cxn>
-              <a:cxn ang="0">
-                <a:pos x="connsiteX15" y="connsiteY15"/>
-              </a:cxn>
-              <a:cxn ang="0">
-                <a:pos x="connsiteX16" y="connsiteY16"/>
-              </a:cxn>
-              <a:cxn ang="0">
-                <a:pos x="connsiteX17" y="connsiteY17"/>
-              </a:cxn>
-              <a:cxn ang="0">
-                <a:pos x="connsiteX18" y="connsiteY18"/>
-              </a:cxn>
-              <a:cxn ang="0">
-                <a:pos x="connsiteX19" y="connsiteY19"/>
-              </a:cxn>
-              <a:cxn ang="0">
-                <a:pos x="connsiteX20" y="connsiteY20"/>
-              </a:cxn>
-            </a:cxnLst>
-            <a:rect l="l" t="t" r="r" b="b"/>
-            <a:pathLst>
-              <a:path w="2832322" h="2697833">
-                <a:moveTo>
-                  <a:pt x="638993" y="1429605"/>
-                </a:moveTo>
-                <a:cubicBezTo>
-                  <a:pt x="701328" y="1421871"/>
-                  <a:pt x="765121" y="1451183"/>
-                  <a:pt x="798503" y="1509001"/>
-                </a:cubicBezTo>
-                <a:cubicBezTo>
-                  <a:pt x="843012" y="1586093"/>
-                  <a:pt x="816599" y="1684670"/>
-                  <a:pt x="739507" y="1729178"/>
-                </a:cubicBezTo>
-                <a:cubicBezTo>
-                  <a:pt x="662415" y="1773688"/>
-                  <a:pt x="563838" y="1747275"/>
-                  <a:pt x="519329" y="1670181"/>
-                </a:cubicBezTo>
-                <a:cubicBezTo>
-                  <a:pt x="474820" y="1593091"/>
-                  <a:pt x="501234" y="1494514"/>
-                  <a:pt x="578327" y="1450005"/>
-                </a:cubicBezTo>
-                <a:cubicBezTo>
-                  <a:pt x="597599" y="1438878"/>
-                  <a:pt x="618215" y="1432183"/>
-                  <a:pt x="638993" y="1429605"/>
-                </a:cubicBezTo>
-                <a:close/>
-                <a:moveTo>
-                  <a:pt x="1252193" y="835524"/>
-                </a:moveTo>
-                <a:cubicBezTo>
-                  <a:pt x="1356532" y="842898"/>
-                  <a:pt x="1455464" y="900282"/>
-                  <a:pt x="1511699" y="997686"/>
-                </a:cubicBezTo>
-                <a:cubicBezTo>
-                  <a:pt x="1601677" y="1153532"/>
-                  <a:pt x="1548280" y="1352810"/>
-                  <a:pt x="1392436" y="1442788"/>
-                </a:cubicBezTo>
-                <a:cubicBezTo>
-                  <a:pt x="1236589" y="1532766"/>
-                  <a:pt x="1037311" y="1479369"/>
-                  <a:pt x="947333" y="1323523"/>
-                </a:cubicBezTo>
-                <a:cubicBezTo>
-                  <a:pt x="857356" y="1167678"/>
-                  <a:pt x="910753" y="968399"/>
-                  <a:pt x="1066598" y="878421"/>
-                </a:cubicBezTo>
-                <a:cubicBezTo>
-                  <a:pt x="1125040" y="844680"/>
-                  <a:pt x="1189590" y="831101"/>
-                  <a:pt x="1252193" y="835524"/>
-                </a:cubicBezTo>
-                <a:close/>
-                <a:moveTo>
-                  <a:pt x="2832322" y="0"/>
-                </a:moveTo>
-                <a:lnTo>
-                  <a:pt x="2832322" y="2697833"/>
-                </a:lnTo>
-                <a:lnTo>
-                  <a:pt x="0" y="2697833"/>
-                </a:lnTo>
-                <a:lnTo>
-                  <a:pt x="12966" y="2631781"/>
-                </a:lnTo>
-                <a:cubicBezTo>
-                  <a:pt x="140000" y="2184738"/>
-                  <a:pt x="505773" y="1908362"/>
-                  <a:pt x="1052443" y="1806313"/>
-                </a:cubicBezTo>
-                <a:cubicBezTo>
-                  <a:pt x="1303109" y="1759472"/>
-                  <a:pt x="1574698" y="1718763"/>
-                  <a:pt x="1721430" y="1489397"/>
-                </a:cubicBezTo>
-                <a:cubicBezTo>
-                  <a:pt x="1879597" y="1241842"/>
-                  <a:pt x="2005704" y="970478"/>
-                  <a:pt x="2115839" y="696540"/>
-                </a:cubicBezTo>
-                <a:cubicBezTo>
-                  <a:pt x="2216937" y="444582"/>
-                  <a:pt x="2354076" y="231931"/>
-                  <a:pt x="2590689" y="99461"/>
-                </a:cubicBezTo>
-                <a:cubicBezTo>
-                  <a:pt x="2637069" y="73498"/>
-                  <a:pt x="2683655" y="51402"/>
-                  <a:pt x="2730434" y="32840"/>
-                </a:cubicBezTo>
-                <a:close/>
-              </a:path>
-            </a:pathLst>
-          </a:custGeom>
-          <a:solidFill>
-            <a:schemeClr val="bg1"/>
-          </a:solidFill>
-          <a:ln>
-            <a:noFill/>
-          </a:ln>
-        </p:spPr>
-        <p:style>
-          <a:lnRef idx="2">
-            <a:schemeClr val="accent1">
-              <a:shade val="50000"/>
-            </a:schemeClr>
-          </a:lnRef>
-          <a:fillRef idx="1">
-            <a:schemeClr val="accent1"/>
-          </a:fillRef>
-          <a:effectRef idx="0">
-            <a:schemeClr val="accent1"/>
-          </a:effectRef>
-          <a:fontRef idx="minor">
-            <a:schemeClr val="lt1"/>
-          </a:fontRef>
-        </p:style>
-        <p:txBody>
-          <a:bodyPr wrap="square" rtlCol="0" anchor="ctr">
-            <a:noAutofit/>
-          </a:bodyPr>
-          <a:lstStyle/>
-          <a:p>
-            <a:pPr algn="ctr"/>
-            <a:endParaRPr lang="en-US"/>
-          </a:p>
-        </p:txBody>
-      </p:sp>
       <p:sp>
         <p:nvSpPr>
           <p:cNvPr id="2" name="Titel 1">
             <a:extLst>
               <a:ext uri="{FF2B5EF4-FFF2-40B4-BE49-F238E27FC236}">
-                <a16:creationId xmlns:a16="http://schemas.microsoft.com/office/drawing/2014/main" id="{A17F7793-E54F-F9FF-F8C8-789A33CD7E1A}"/>
+                <a16:creationId xmlns:a16="http://schemas.microsoft.com/office/drawing/2014/main" id="{5F927641-F6B1-1C11-381B-D4E3D37285D2}"/>
               </a:ext>
             </a:extLst>
           </p:cNvPr>
@@ -7512,105 +7723,61 @@
             <p:ph type="title"/>
           </p:nvPr>
         </p:nvSpPr>
-        <p:spPr>
-          <a:xfrm>
-            <a:off x="609600" y="552782"/>
-            <a:ext cx="6937612" cy="1339323"/>
-          </a:xfrm>
-        </p:spPr>
-        <p:txBody>
-          <a:bodyPr>
-            <a:normAutofit/>
-          </a:bodyPr>
-          <a:lstStyle/>
-          <a:p>
+        <p:spPr/>
+        <p:txBody>
+          <a:bodyPr/>
+          <a:lstStyle/>
+          <a:p>
+            <a:r>
+              <a:rPr lang="de-DE" b="1" u="sng" dirty="0" err="1">
+                <a:cs typeface="Posterama"/>
+              </a:rPr>
+              <a:t>Trainning</a:t>
+            </a:r>
             <a:r>
               <a:rPr lang="de-DE" b="1" u="sng" dirty="0">
                 <a:cs typeface="Posterama"/>
               </a:rPr>
-              <a:t>Segmentierung/Glättung</a:t>
-            </a:r>
-          </a:p>
-        </p:txBody>
-      </p:sp>
-      <p:sp>
-        <p:nvSpPr>
-          <p:cNvPr id="11" name="Inhaltsplatzhalter 10">
-            <a:extLst>
-              <a:ext uri="{FF2B5EF4-FFF2-40B4-BE49-F238E27FC236}">
-                <a16:creationId xmlns:a16="http://schemas.microsoft.com/office/drawing/2014/main" id="{9AF1DFE3-1A6E-D0F5-489E-A683E3AC8394}"/>
-              </a:ext>
-            </a:extLst>
-          </p:cNvPr>
-          <p:cNvSpPr>
-            <a:spLocks noGrp="1"/>
-          </p:cNvSpPr>
-          <p:nvPr>
-            <p:ph idx="1"/>
-          </p:nvPr>
-        </p:nvSpPr>
-        <p:spPr>
-          <a:xfrm>
-            <a:off x="609600" y="2444887"/>
-            <a:ext cx="6854598" cy="3911463"/>
-          </a:xfrm>
-        </p:spPr>
-        <p:txBody>
-          <a:bodyPr vert="horz" lIns="91440" tIns="45720" rIns="91440" bIns="45720" rtlCol="0" anchor="t">
-            <a:noAutofit/>
-          </a:bodyPr>
-          <a:lstStyle/>
-          <a:p>
-            <a:r>
-              <a:rPr lang="de-DE" sz="2800" dirty="0"/>
-              <a:t>Überlappende Fenster zur Glättung der Ausgabe:</a:t>
-            </a:r>
-          </a:p>
-          <a:p>
-            <a:pPr marL="457200" indent="-457200">
-              <a:buFontTx/>
-              <a:buChar char="-"/>
-            </a:pPr>
-            <a:r>
-              <a:rPr lang="de-DE" sz="2800" dirty="0"/>
-              <a:t>Unterteilung in beliebig lange Segmente</a:t>
-            </a:r>
-          </a:p>
-          <a:p>
-            <a:pPr marL="457200" indent="-457200">
-              <a:buFontTx/>
-              <a:buChar char="-"/>
-            </a:pPr>
-            <a:r>
-              <a:rPr lang="de-DE" sz="2800" dirty="0"/>
-              <a:t>Fenstergröße beliebig groß wählbar</a:t>
-            </a:r>
-          </a:p>
-          <a:p>
-            <a:pPr marL="457200" indent="-457200">
-              <a:buFontTx/>
-              <a:buChar char="-"/>
-            </a:pPr>
-            <a:r>
-              <a:rPr lang="de-DE" sz="2800" dirty="0"/>
-              <a:t>Glättung der einzelnen Segmente mittels Vor-/Nachgänger</a:t>
-            </a:r>
-          </a:p>
-          <a:p>
-            <a:pPr marL="457200" indent="-457200">
-              <a:buFontTx/>
-              <a:buChar char="-"/>
-            </a:pPr>
-            <a:endParaRPr lang="de-DE" sz="2800" dirty="0"/>
+              <a:t> SVM</a:t>
+            </a:r>
+          </a:p>
+        </p:txBody>
+      </p:sp>
+      <p:sp>
+        <p:nvSpPr>
+          <p:cNvPr id="6" name="Foliennummernplatzhalter 5">
+            <a:extLst>
+              <a:ext uri="{FF2B5EF4-FFF2-40B4-BE49-F238E27FC236}">
+                <a16:creationId xmlns:a16="http://schemas.microsoft.com/office/drawing/2014/main" id="{0A1D13E5-5CD6-4D9B-103E-82BE5D070BD1}"/>
+              </a:ext>
+            </a:extLst>
+          </p:cNvPr>
+          <p:cNvSpPr>
+            <a:spLocks noGrp="1"/>
+          </p:cNvSpPr>
+          <p:nvPr>
+            <p:ph type="sldNum" sz="quarter" idx="12"/>
+          </p:nvPr>
+        </p:nvSpPr>
+        <p:spPr/>
+        <p:txBody>
+          <a:bodyPr/>
+          <a:lstStyle/>
+          <a:p>
+            <a:fld id="{1F646F3F-274D-499B-ABBE-824EB4ABDC3D}" type="slidenum">
+              <a:rPr lang="en-US" smtClean="0"/>
+              <a:t>9</a:t>
+            </a:fld>
+            <a:endParaRPr lang="de-DE"/>
           </a:p>
         </p:txBody>
       </p:sp>
       <p:pic>
         <p:nvPicPr>
-          <p:cNvPr id="4" name="Grafik 3">
-            <a:extLst>
-              <a:ext uri="{FF2B5EF4-FFF2-40B4-BE49-F238E27FC236}">
-                <a16:creationId xmlns:a16="http://schemas.microsoft.com/office/drawing/2014/main" id="{81461DF0-7BFC-B052-EF66-CAD9491E42B6}"/>
+          <p:cNvPr id="13" name="Grafik 12" descr="Ein Bild, das Text, Schrift, Grafiken, Screenshot enthält.">
+            <a:extLst>
+              <a:ext uri="{FF2B5EF4-FFF2-40B4-BE49-F238E27FC236}">
+                <a16:creationId xmlns:a16="http://schemas.microsoft.com/office/drawing/2014/main" id="{5333A9AD-A782-28E0-CF2E-35C52F9795F3}"/>
               </a:ext>
             </a:extLst>
           </p:cNvPr>
@@ -7627,8 +7794,8 @@
         </p:blipFill>
         <p:spPr>
           <a:xfrm>
-            <a:off x="7544597" y="3836317"/>
-            <a:ext cx="4563955" cy="1129579"/>
+            <a:off x="8125355" y="47624"/>
+            <a:ext cx="3738563" cy="678658"/>
           </a:xfrm>
           <a:prstGeom prst="rect">
             <a:avLst/>
@@ -7637,10 +7804,10 @@
       </p:pic>
       <p:pic>
         <p:nvPicPr>
-          <p:cNvPr id="13" name="Grafik 12" descr="Ein Bild, das Text, Schrift, Grafiken, Screenshot enthält.">
-            <a:extLst>
-              <a:ext uri="{FF2B5EF4-FFF2-40B4-BE49-F238E27FC236}">
-                <a16:creationId xmlns:a16="http://schemas.microsoft.com/office/drawing/2014/main" id="{67250A16-3D8D-A8C6-F19D-117FD002707E}"/>
+          <p:cNvPr id="3" name="Grafik 2" descr="Ein Bild, das Text, Diagramm, Reihe, Screenshot enthält.&#10;&#10;Beschreibung automatisch generiert.">
+            <a:extLst>
+              <a:ext uri="{FF2B5EF4-FFF2-40B4-BE49-F238E27FC236}">
+                <a16:creationId xmlns:a16="http://schemas.microsoft.com/office/drawing/2014/main" id="{61228266-A1A0-4734-54AE-3A5BE2CBCFF6}"/>
               </a:ext>
             </a:extLst>
           </p:cNvPr>
@@ -7651,70 +7818,52 @@
         </p:nvPicPr>
         <p:blipFill>
           <a:blip r:embed="rId3"/>
-          <a:stretch>
-            <a:fillRect/>
-          </a:stretch>
+          <a:srcRect l="2619" t="5698" r="2212" b="285"/>
+          <a:stretch/>
         </p:blipFill>
         <p:spPr>
           <a:xfrm>
-            <a:off x="7851215" y="136525"/>
-            <a:ext cx="4114800" cy="740664"/>
+            <a:off x="349855" y="1915302"/>
+            <a:ext cx="5401398" cy="4178273"/>
           </a:xfrm>
           <a:prstGeom prst="rect">
             <a:avLst/>
           </a:prstGeom>
         </p:spPr>
       </p:pic>
-      <p:sp>
-        <p:nvSpPr>
-          <p:cNvPr id="6" name="Foliennummernplatzhalter 5">
-            <a:extLst>
-              <a:ext uri="{FF2B5EF4-FFF2-40B4-BE49-F238E27FC236}">
-                <a16:creationId xmlns:a16="http://schemas.microsoft.com/office/drawing/2014/main" id="{B8D9A034-94B9-14D5-800C-99F5F70F3CC2}"/>
-              </a:ext>
-            </a:extLst>
-          </p:cNvPr>
-          <p:cNvSpPr>
-            <a:spLocks noGrp="1"/>
-          </p:cNvSpPr>
-          <p:nvPr>
-            <p:ph type="sldNum" sz="quarter" idx="12"/>
-          </p:nvPr>
-        </p:nvSpPr>
+      <p:pic>
+        <p:nvPicPr>
+          <p:cNvPr id="4" name="Grafik 3" descr="Ein Bild, das Text, Screenshot, Display, Rechteck enthält.&#10;&#10;Beschreibung automatisch generiert.">
+            <a:extLst>
+              <a:ext uri="{FF2B5EF4-FFF2-40B4-BE49-F238E27FC236}">
+                <a16:creationId xmlns:a16="http://schemas.microsoft.com/office/drawing/2014/main" id="{2ABD9218-3D50-D822-23AC-A985DEECEED5}"/>
+              </a:ext>
+            </a:extLst>
+          </p:cNvPr>
+          <p:cNvPicPr>
+            <a:picLocks noChangeAspect="1"/>
+          </p:cNvPicPr>
+          <p:nvPr/>
+        </p:nvPicPr>
+        <p:blipFill>
+          <a:blip r:embed="rId4"/>
+          <a:srcRect l="3770" r="794" b="-1213"/>
+          <a:stretch/>
+        </p:blipFill>
         <p:spPr>
           <a:xfrm>
-            <a:off x="10134600" y="6356350"/>
-            <a:ext cx="1447800" cy="365125"/>
+            <a:off x="5863363" y="1715346"/>
+            <a:ext cx="5398248" cy="4581110"/>
           </a:xfrm>
+          <a:prstGeom prst="rect">
+            <a:avLst/>
+          </a:prstGeom>
         </p:spPr>
-        <p:txBody>
-          <a:bodyPr>
-            <a:normAutofit/>
-          </a:bodyPr>
-          <a:lstStyle/>
-          <a:p>
-            <a:pPr>
-              <a:spcAft>
-                <a:spcPts val="600"/>
-              </a:spcAft>
-            </a:pPr>
-            <a:fld id="{1F646F3F-274D-499B-ABBE-824EB4ABDC3D}" type="slidenum">
-              <a:rPr lang="en-US" smtClean="0"/>
-              <a:pPr>
-                <a:spcAft>
-                  <a:spcPts val="600"/>
-                </a:spcAft>
-              </a:pPr>
-              <a:t>9</a:t>
-            </a:fld>
-            <a:endParaRPr lang="de-DE"/>
-          </a:p>
-        </p:txBody>
-      </p:sp>
+      </p:pic>
     </p:spTree>
     <p:extLst>
       <p:ext uri="{BB962C8B-B14F-4D97-AF65-F5344CB8AC3E}">
-        <p14:creationId xmlns:p14="http://schemas.microsoft.com/office/powerpoint/2010/main" val="3441322297"/>
+        <p14:creationId xmlns:p14="http://schemas.microsoft.com/office/powerpoint/2010/main" val="4075924249"/>
       </p:ext>
     </p:extLst>
   </p:cSld>

</xml_diff>